<commit_message>
Adicionando apresentacoes do canal
</commit_message>
<xml_diff>
--- a/Estatistica/Estatistica_Basica.pptx
+++ b/Estatistica/Estatistica_Basica.pptx
@@ -6569,8 +6569,8 @@
           <a:chExt cx="0" cy="0"/>
         </a:xfrm>
       </p:grpSpPr>
-      <mc:AlternateContent xmlns:mc="http://schemas.openxmlformats.org/markup-compatibility/2006">
-        <mc:Choice xmlns:a14="http://schemas.microsoft.com/office/drawing/2010/main" Requires="a14">
+      <mc:AlternateContent xmlns:mc="http://schemas.openxmlformats.org/markup-compatibility/2006" xmlns:a14="http://schemas.microsoft.com/office/drawing/2010/main">
+        <mc:Choice Requires="a14">
           <p:sp>
             <p:nvSpPr>
               <p:cNvPr id="3" name="Espaço Reservado para Conteúdo 2">
@@ -6678,7 +6678,7 @@
             </p:txBody>
           </p:sp>
         </mc:Choice>
-        <mc:Fallback>
+        <mc:Fallback xmlns="">
           <p:sp>
             <p:nvSpPr>
               <p:cNvPr id="3" name="Espaço Reservado para Conteúdo 2">
@@ -6791,8 +6791,8 @@
           <a:chExt cx="0" cy="0"/>
         </a:xfrm>
       </p:grpSpPr>
-      <mc:AlternateContent xmlns:mc="http://schemas.openxmlformats.org/markup-compatibility/2006">
-        <mc:Choice xmlns:a14="http://schemas.microsoft.com/office/drawing/2010/main" Requires="a14">
+      <mc:AlternateContent xmlns:mc="http://schemas.openxmlformats.org/markup-compatibility/2006" xmlns:a14="http://schemas.microsoft.com/office/drawing/2010/main">
+        <mc:Choice Requires="a14">
           <p:sp>
             <p:nvSpPr>
               <p:cNvPr id="3" name="Espaço Reservado para Conteúdo 2">
@@ -6956,7 +6956,7 @@
             </p:txBody>
           </p:sp>
         </mc:Choice>
-        <mc:Fallback>
+        <mc:Fallback xmlns="">
           <p:sp>
             <p:nvSpPr>
               <p:cNvPr id="3" name="Espaço Reservado para Conteúdo 2">
@@ -7390,36 +7390,15 @@
             <a:pPr algn="ctr"/>
             <a:r>
               <a:rPr lang="pt-BR" dirty="0"/>
-              <a:t>GitHub: </a:t>
-            </a:r>
-            <a:r>
-              <a:rPr lang="pt-BR" dirty="0">
-                <a:hlinkClick r:id="rId2"/>
-              </a:rPr>
-              <a:t>https://github.com/danmorales/CursoDS_ProfDanilo</a:t>
-            </a:r>
+              <a:t>GitHub: https://github.com/danmorales/CursoDS_ProfDanilo </a:t>
+            </a:r>
+          </a:p>
+          <a:p>
+            <a:pPr algn="ctr"/>
             <a:r>
               <a:rPr lang="pt-BR" dirty="0"/>
-              <a:t> </a:t>
-            </a:r>
-          </a:p>
-          <a:p>
-            <a:pPr algn="ctr"/>
-            <a:r>
-              <a:rPr lang="pt-BR" dirty="0" err="1"/>
-              <a:t>Email</a:t>
-            </a:r>
-            <a:r>
-              <a:rPr lang="pt-BR" dirty="0"/>
-              <a:t>: </a:t>
-            </a:r>
-            <a:r>
-              <a:rPr lang="pt-BR" dirty="0">
-                <a:hlinkClick r:id="rId3"/>
-              </a:rPr>
-              <a:t>cursods_profdanilo@gmail.com</a:t>
-            </a:r>
-            <a:endParaRPr lang="pt-BR" dirty="0"/>
+              <a:t>E-mail: cursods_profdanilo@gmail.com</a:t>
+            </a:r>
           </a:p>
           <a:p>
             <a:endParaRPr lang="pt-BR" dirty="0"/>
@@ -7492,13 +7471,8 @@
             <a:pPr algn="ctr"/>
             <a:r>
               <a:rPr lang="pt-BR" dirty="0"/>
-              <a:t>Curta o canal para receber notificações de novos </a:t>
-            </a:r>
-            <a:r>
-              <a:rPr lang="pt-BR" dirty="0" err="1"/>
-              <a:t>vídoes</a:t>
-            </a:r>
-            <a:endParaRPr lang="pt-BR" dirty="0"/>
+              <a:t>Curta o canal para receber notificações de novos vídeos</a:t>
+            </a:r>
           </a:p>
           <a:p>
             <a:pPr algn="ctr"/>

</xml_diff>

<commit_message>
Corrigido modulo de estatistica
</commit_message>
<xml_diff>
--- a/Estatistica/Estatistica_Basica.pptx
+++ b/Estatistica/Estatistica_Basica.pptx
@@ -7406,6 +7406,41 @@
             <a:endParaRPr lang="pt-BR" dirty="0"/>
           </a:p>
           <a:p>
+            <a:pPr algn="ctr"/>
+            <a:r>
+              <a:rPr lang="pt-BR" dirty="0" err="1"/>
+              <a:t>Facebook</a:t>
+            </a:r>
+            <a:r>
+              <a:rPr lang="pt-BR" dirty="0"/>
+              <a:t>: </a:t>
+            </a:r>
+            <a:r>
+              <a:rPr lang="pt-BR" dirty="0" err="1"/>
+              <a:t>https</a:t>
+            </a:r>
+            <a:r>
+              <a:rPr lang="pt-BR" dirty="0"/>
+              <a:t>://</a:t>
+            </a:r>
+            <a:r>
+              <a:rPr lang="pt-BR" dirty="0" err="1"/>
+              <a:t>www.facebook.com</a:t>
+            </a:r>
+            <a:r>
+              <a:rPr lang="pt-BR" dirty="0"/>
+              <a:t>/</a:t>
+            </a:r>
+            <a:r>
+              <a:rPr lang="pt-BR"/>
+              <a:t>profdanilods/</a:t>
+            </a:r>
+            <a:endParaRPr lang="pt-BR" dirty="0"/>
+          </a:p>
+          <a:p>
+            <a:pPr marL="0" indent="0">
+              <a:buNone/>
+            </a:pPr>
             <a:endParaRPr lang="pt-BR" dirty="0"/>
           </a:p>
         </p:txBody>

</xml_diff>